<commit_message>
Se actualizan los README
</commit_message>
<xml_diff>
--- a/Documentation/Screens/plantilla.pptx
+++ b/Documentation/Screens/plantilla.pptx
@@ -104,6 +104,11 @@
       </a:defRPr>
     </a:lvl9pPr>
   </p:defaultTextStyle>
+  <p:extLst>
+    <p:ext uri="{EFAFB233-063F-42B5-8137-9DF3F51BA10A}">
+      <p15:sldGuideLst xmlns:p15="http://schemas.microsoft.com/office/powerpoint/2012/main"/>
+    </p:ext>
+  </p:extLst>
 </p:presentation>
 </file>
 
@@ -238,7 +243,7 @@
           <a:p>
             <a:fld id="{1DDE44B3-A3FB-4DB1-B939-7C3756876889}" type="datetimeFigureOut">
               <a:rPr lang="es-MX" smtClean="0"/>
-              <a:t>12/09/2025</a:t>
+              <a:t>23/09/2025</a:t>
             </a:fld>
             <a:endParaRPr lang="es-MX"/>
           </a:p>
@@ -408,7 +413,7 @@
           <a:p>
             <a:fld id="{1DDE44B3-A3FB-4DB1-B939-7C3756876889}" type="datetimeFigureOut">
               <a:rPr lang="es-MX" smtClean="0"/>
-              <a:t>12/09/2025</a:t>
+              <a:t>23/09/2025</a:t>
             </a:fld>
             <a:endParaRPr lang="es-MX"/>
           </a:p>
@@ -588,7 +593,7 @@
           <a:p>
             <a:fld id="{1DDE44B3-A3FB-4DB1-B939-7C3756876889}" type="datetimeFigureOut">
               <a:rPr lang="es-MX" smtClean="0"/>
-              <a:t>12/09/2025</a:t>
+              <a:t>23/09/2025</a:t>
             </a:fld>
             <a:endParaRPr lang="es-MX"/>
           </a:p>
@@ -758,7 +763,7 @@
           <a:p>
             <a:fld id="{1DDE44B3-A3FB-4DB1-B939-7C3756876889}" type="datetimeFigureOut">
               <a:rPr lang="es-MX" smtClean="0"/>
-              <a:t>12/09/2025</a:t>
+              <a:t>23/09/2025</a:t>
             </a:fld>
             <a:endParaRPr lang="es-MX"/>
           </a:p>
@@ -1004,7 +1009,7 @@
           <a:p>
             <a:fld id="{1DDE44B3-A3FB-4DB1-B939-7C3756876889}" type="datetimeFigureOut">
               <a:rPr lang="es-MX" smtClean="0"/>
-              <a:t>12/09/2025</a:t>
+              <a:t>23/09/2025</a:t>
             </a:fld>
             <a:endParaRPr lang="es-MX"/>
           </a:p>
@@ -1236,7 +1241,7 @@
           <a:p>
             <a:fld id="{1DDE44B3-A3FB-4DB1-B939-7C3756876889}" type="datetimeFigureOut">
               <a:rPr lang="es-MX" smtClean="0"/>
-              <a:t>12/09/2025</a:t>
+              <a:t>23/09/2025</a:t>
             </a:fld>
             <a:endParaRPr lang="es-MX"/>
           </a:p>
@@ -1603,7 +1608,7 @@
           <a:p>
             <a:fld id="{1DDE44B3-A3FB-4DB1-B939-7C3756876889}" type="datetimeFigureOut">
               <a:rPr lang="es-MX" smtClean="0"/>
-              <a:t>12/09/2025</a:t>
+              <a:t>23/09/2025</a:t>
             </a:fld>
             <a:endParaRPr lang="es-MX"/>
           </a:p>
@@ -1721,7 +1726,7 @@
           <a:p>
             <a:fld id="{1DDE44B3-A3FB-4DB1-B939-7C3756876889}" type="datetimeFigureOut">
               <a:rPr lang="es-MX" smtClean="0"/>
-              <a:t>12/09/2025</a:t>
+              <a:t>23/09/2025</a:t>
             </a:fld>
             <a:endParaRPr lang="es-MX"/>
           </a:p>
@@ -1816,7 +1821,7 @@
           <a:p>
             <a:fld id="{1DDE44B3-A3FB-4DB1-B939-7C3756876889}" type="datetimeFigureOut">
               <a:rPr lang="es-MX" smtClean="0"/>
-              <a:t>12/09/2025</a:t>
+              <a:t>23/09/2025</a:t>
             </a:fld>
             <a:endParaRPr lang="es-MX"/>
           </a:p>
@@ -2093,7 +2098,7 @@
           <a:p>
             <a:fld id="{1DDE44B3-A3FB-4DB1-B939-7C3756876889}" type="datetimeFigureOut">
               <a:rPr lang="es-MX" smtClean="0"/>
-              <a:t>12/09/2025</a:t>
+              <a:t>23/09/2025</a:t>
             </a:fld>
             <a:endParaRPr lang="es-MX"/>
           </a:p>
@@ -2350,7 +2355,7 @@
           <a:p>
             <a:fld id="{1DDE44B3-A3FB-4DB1-B939-7C3756876889}" type="datetimeFigureOut">
               <a:rPr lang="es-MX" smtClean="0"/>
-              <a:t>12/09/2025</a:t>
+              <a:t>23/09/2025</a:t>
             </a:fld>
             <a:endParaRPr lang="es-MX"/>
           </a:p>
@@ -2563,7 +2568,7 @@
           <a:p>
             <a:fld id="{1DDE44B3-A3FB-4DB1-B939-7C3756876889}" type="datetimeFigureOut">
               <a:rPr lang="es-MX" smtClean="0"/>
-              <a:t>12/09/2025</a:t>
+              <a:t>23/09/2025</a:t>
             </a:fld>
             <a:endParaRPr lang="es-MX"/>
           </a:p>
@@ -2982,7 +2987,7 @@
         </p:nvSpPr>
         <p:spPr>
           <a:xfrm>
-            <a:off x="260984" y="119270"/>
+            <a:off x="321310" y="127759"/>
             <a:ext cx="11657330" cy="8878956"/>
           </a:xfrm>
           <a:prstGeom prst="roundRect">
@@ -3065,7 +3070,15 @@
             </a:r>
             <a:r>
               <a:rPr lang="en-US" sz="1399" b="1" dirty="0"/>
-              <a:t>:</a:t>
+              <a:t>: </a:t>
+            </a:r>
+            <a:r>
+              <a:rPr lang="en-US" sz="1399" b="1" i="1" dirty="0"/>
+              <a:t>LOGIN</a:t>
+            </a:r>
+            <a:r>
+              <a:rPr lang="en-US" sz="1399" b="1" dirty="0"/>
+              <a:t>	</a:t>
             </a:r>
           </a:p>
         </p:txBody>
@@ -3117,9 +3130,141 @@
             </a:r>
             <a:r>
               <a:rPr lang="en-US" sz="1399" b="1" dirty="0"/>
-              <a:t>:</a:t>
-            </a:r>
-            <a:endParaRPr lang="es-MX" sz="1399" b="1" i="1" dirty="0"/>
+              <a:t>: </a:t>
+            </a:r>
+            <a:r>
+              <a:rPr lang="en-US" sz="1399" b="1" i="1" u="sng" dirty="0"/>
+              <a:t>En </a:t>
+            </a:r>
+            <a:r>
+              <a:rPr lang="en-US" sz="1399" b="1" i="1" u="sng" dirty="0" err="1"/>
+              <a:t>esta</a:t>
+            </a:r>
+            <a:r>
+              <a:rPr lang="en-US" sz="1399" b="1" i="1" u="sng" dirty="0"/>
+              <a:t> </a:t>
+            </a:r>
+            <a:r>
+              <a:rPr lang="en-US" sz="1399" b="1" i="1" u="sng" dirty="0" err="1"/>
+              <a:t>pantalla</a:t>
+            </a:r>
+            <a:r>
+              <a:rPr lang="en-US" sz="1399" b="1" i="1" u="sng" dirty="0"/>
+              <a:t> </a:t>
+            </a:r>
+            <a:r>
+              <a:rPr lang="en-US" sz="1399" b="1" i="1" u="sng" dirty="0" err="1"/>
+              <a:t>el</a:t>
+            </a:r>
+            <a:r>
+              <a:rPr lang="en-US" sz="1399" b="1" i="1" u="sng" dirty="0"/>
+              <a:t> </a:t>
+            </a:r>
+            <a:r>
+              <a:rPr lang="en-US" sz="1399" b="1" i="1" u="sng" dirty="0" err="1"/>
+              <a:t>usuario</a:t>
+            </a:r>
+            <a:r>
+              <a:rPr lang="en-US" sz="1399" b="1" i="1" u="sng" dirty="0"/>
+              <a:t> </a:t>
+            </a:r>
+            <a:r>
+              <a:rPr lang="en-US" sz="1399" b="1" i="1" u="sng" dirty="0" err="1"/>
+              <a:t>puede</a:t>
+            </a:r>
+            <a:r>
+              <a:rPr lang="en-US" sz="1399" b="1" i="1" u="sng" dirty="0"/>
+              <a:t> </a:t>
+            </a:r>
+            <a:r>
+              <a:rPr lang="en-US" sz="1399" b="1" i="1" u="sng" dirty="0" err="1"/>
+              <a:t>ingresar</a:t>
+            </a:r>
+            <a:r>
+              <a:rPr lang="en-US" sz="1399" b="1" i="1" u="sng" dirty="0"/>
+              <a:t> sus </a:t>
+            </a:r>
+            <a:r>
+              <a:rPr lang="en-US" sz="1399" b="1" i="1" u="sng" dirty="0" err="1"/>
+              <a:t>credenciales</a:t>
+            </a:r>
+            <a:r>
+              <a:rPr lang="en-US" sz="1399" b="1" i="1" u="sng" dirty="0"/>
+              <a:t> para </a:t>
+            </a:r>
+            <a:r>
+              <a:rPr lang="en-US" sz="1399" b="1" i="1" u="sng" dirty="0" err="1"/>
+              <a:t>tener</a:t>
+            </a:r>
+            <a:r>
+              <a:rPr lang="en-US" sz="1399" b="1" i="1" u="sng" dirty="0"/>
+              <a:t> </a:t>
+            </a:r>
+            <a:r>
+              <a:rPr lang="en-US" sz="1399" b="1" i="1" u="sng" dirty="0" err="1"/>
+              <a:t>acceso</a:t>
+            </a:r>
+            <a:r>
+              <a:rPr lang="en-US" sz="1399" b="1" i="1" u="sng" dirty="0"/>
+              <a:t> al Sistema, </a:t>
+            </a:r>
+            <a:r>
+              <a:rPr lang="en-US" sz="1399" b="1" i="1" u="sng" dirty="0" err="1"/>
+              <a:t>dependiendo</a:t>
+            </a:r>
+            <a:r>
+              <a:rPr lang="en-US" sz="1399" b="1" i="1" u="sng" dirty="0"/>
+              <a:t> del </a:t>
+            </a:r>
+            <a:r>
+              <a:rPr lang="en-US" sz="1399" b="1" i="1" u="sng" dirty="0" err="1"/>
+              <a:t>tipo</a:t>
+            </a:r>
+            <a:r>
+              <a:rPr lang="en-US" sz="1399" b="1" i="1" u="sng" dirty="0"/>
+              <a:t> de </a:t>
+            </a:r>
+            <a:r>
+              <a:rPr lang="en-US" sz="1399" b="1" i="1" u="sng" dirty="0" err="1"/>
+              <a:t>usuario</a:t>
+            </a:r>
+            <a:r>
+              <a:rPr lang="en-US" sz="1399" b="1" i="1" u="sng" dirty="0"/>
+              <a:t> se </a:t>
+            </a:r>
+            <a:r>
+              <a:rPr lang="en-US" sz="1399" b="1" i="1" u="sng" dirty="0" err="1"/>
+              <a:t>mostrara</a:t>
+            </a:r>
+            <a:r>
+              <a:rPr lang="en-US" sz="1399" b="1" i="1" u="sng" dirty="0"/>
+              <a:t> </a:t>
+            </a:r>
+            <a:r>
+              <a:rPr lang="en-US" sz="1399" b="1" i="1" u="sng" dirty="0" err="1"/>
+              <a:t>diferente</a:t>
+            </a:r>
+            <a:r>
+              <a:rPr lang="en-US" sz="1399" b="1" i="1" u="sng" dirty="0"/>
+              <a:t> </a:t>
+            </a:r>
+            <a:r>
+              <a:rPr lang="en-US" sz="1399" b="1" i="1" u="sng" dirty="0" err="1"/>
+              <a:t>flujo</a:t>
+            </a:r>
+            <a:r>
+              <a:rPr lang="en-US" sz="1399" b="1" i="1" u="sng" dirty="0"/>
+              <a:t> de </a:t>
+            </a:r>
+            <a:r>
+              <a:rPr lang="en-US" sz="1399" b="1" i="1" u="sng" dirty="0" err="1"/>
+              <a:t>pantallas</a:t>
+            </a:r>
+            <a:r>
+              <a:rPr lang="en-US" sz="1399" b="1" i="1" u="sng" dirty="0"/>
+              <a:t>.</a:t>
+            </a:r>
+            <a:endParaRPr lang="es-MX" sz="1399" b="1" i="1" u="sng" dirty="0"/>
           </a:p>
         </p:txBody>
       </p:sp>
@@ -3178,12 +3323,2097 @@
             </a:r>
             <a:r>
               <a:rPr lang="en-US" sz="1399" b="1" dirty="0"/>
-              <a:t> :</a:t>
+              <a:t> : ORLANDO CASAS</a:t>
             </a:r>
             <a:endParaRPr lang="es-MX" sz="1399" b="1" i="1" dirty="0"/>
           </a:p>
         </p:txBody>
       </p:sp>
+      <p:sp>
+        <p:nvSpPr>
+          <p:cNvPr id="2" name="Rectángulo: esquinas redondeadas 1">
+            <a:extLst>
+              <a:ext uri="{FF2B5EF4-FFF2-40B4-BE49-F238E27FC236}">
+                <a16:creationId xmlns:a16="http://schemas.microsoft.com/office/drawing/2014/main" id="{28CFD779-3FE3-EE4B-1205-2BB006B1542C}"/>
+              </a:ext>
+            </a:extLst>
+          </p:cNvPr>
+          <p:cNvSpPr/>
+          <p:nvPr/>
+        </p:nvSpPr>
+        <p:spPr>
+          <a:xfrm>
+            <a:off x="3015145" y="1756862"/>
+            <a:ext cx="6149008" cy="6337959"/>
+          </a:xfrm>
+          <a:prstGeom prst="roundRect">
+            <a:avLst/>
+          </a:prstGeom>
+        </p:spPr>
+        <p:style>
+          <a:lnRef idx="2">
+            <a:schemeClr val="accent1"/>
+          </a:lnRef>
+          <a:fillRef idx="1">
+            <a:schemeClr val="lt1"/>
+          </a:fillRef>
+          <a:effectRef idx="0">
+            <a:schemeClr val="accent1"/>
+          </a:effectRef>
+          <a:fontRef idx="minor">
+            <a:schemeClr val="dk1"/>
+          </a:fontRef>
+        </p:style>
+        <p:txBody>
+          <a:bodyPr rtlCol="0" anchor="ctr"/>
+          <a:lstStyle/>
+          <a:p>
+            <a:pPr algn="ctr"/>
+            <a:endParaRPr lang="es-MX"/>
+          </a:p>
+        </p:txBody>
+      </p:sp>
+      <p:sp>
+        <p:nvSpPr>
+          <p:cNvPr id="3" name="CuadroTexto 2">
+            <a:extLst>
+              <a:ext uri="{FF2B5EF4-FFF2-40B4-BE49-F238E27FC236}">
+                <a16:creationId xmlns:a16="http://schemas.microsoft.com/office/drawing/2014/main" id="{DCBD829E-1964-C54F-EA86-B5DDD150B740}"/>
+              </a:ext>
+            </a:extLst>
+          </p:cNvPr>
+          <p:cNvSpPr txBox="1"/>
+          <p:nvPr/>
+        </p:nvSpPr>
+        <p:spPr>
+          <a:xfrm>
+            <a:off x="3505200" y="2888974"/>
+            <a:ext cx="1974850" cy="369332"/>
+          </a:xfrm>
+          <a:prstGeom prst="rect">
+            <a:avLst/>
+          </a:prstGeom>
+          <a:noFill/>
+        </p:spPr>
+        <p:txBody>
+          <a:bodyPr wrap="square" rtlCol="0">
+            <a:spAutoFit/>
+          </a:bodyPr>
+          <a:lstStyle/>
+          <a:p>
+            <a:pPr algn="ctr"/>
+            <a:r>
+              <a:rPr lang="en-US" dirty="0" err="1"/>
+              <a:t>Usuario</a:t>
+            </a:r>
+            <a:r>
+              <a:rPr lang="en-US" dirty="0"/>
+              <a:t> o Correo:</a:t>
+            </a:r>
+            <a:endParaRPr lang="es-MX" dirty="0"/>
+          </a:p>
+        </p:txBody>
+      </p:sp>
+      <p:sp>
+        <p:nvSpPr>
+          <p:cNvPr id="4" name="Rectángulo 3">
+            <a:extLst>
+              <a:ext uri="{FF2B5EF4-FFF2-40B4-BE49-F238E27FC236}">
+                <a16:creationId xmlns:a16="http://schemas.microsoft.com/office/drawing/2014/main" id="{0630A642-23E9-3460-090F-3D5EA76C2FF6}"/>
+              </a:ext>
+            </a:extLst>
+          </p:cNvPr>
+          <p:cNvSpPr/>
+          <p:nvPr/>
+        </p:nvSpPr>
+        <p:spPr>
+          <a:xfrm>
+            <a:off x="5619750" y="2800350"/>
+            <a:ext cx="2667000" cy="552450"/>
+          </a:xfrm>
+          <a:prstGeom prst="rect">
+            <a:avLst/>
+          </a:prstGeom>
+        </p:spPr>
+        <p:style>
+          <a:lnRef idx="2">
+            <a:schemeClr val="accent2"/>
+          </a:lnRef>
+          <a:fillRef idx="1">
+            <a:schemeClr val="lt1"/>
+          </a:fillRef>
+          <a:effectRef idx="0">
+            <a:schemeClr val="accent2"/>
+          </a:effectRef>
+          <a:fontRef idx="minor">
+            <a:schemeClr val="dk1"/>
+          </a:fontRef>
+        </p:style>
+        <p:txBody>
+          <a:bodyPr rtlCol="0" anchor="ctr"/>
+          <a:lstStyle/>
+          <a:p>
+            <a:pPr algn="ctr"/>
+            <a:r>
+              <a:rPr lang="en-US" dirty="0"/>
+              <a:t>Admin</a:t>
+            </a:r>
+            <a:endParaRPr lang="es-MX" dirty="0"/>
+          </a:p>
+        </p:txBody>
+      </p:sp>
+      <p:sp>
+        <p:nvSpPr>
+          <p:cNvPr id="6" name="CuadroTexto 5">
+            <a:extLst>
+              <a:ext uri="{FF2B5EF4-FFF2-40B4-BE49-F238E27FC236}">
+                <a16:creationId xmlns:a16="http://schemas.microsoft.com/office/drawing/2014/main" id="{D734E6F3-EC40-CE38-90BD-8B3C53E1783B}"/>
+              </a:ext>
+            </a:extLst>
+          </p:cNvPr>
+          <p:cNvSpPr txBox="1"/>
+          <p:nvPr/>
+        </p:nvSpPr>
+        <p:spPr>
+          <a:xfrm>
+            <a:off x="3575050" y="4129567"/>
+            <a:ext cx="1974850" cy="369332"/>
+          </a:xfrm>
+          <a:prstGeom prst="rect">
+            <a:avLst/>
+          </a:prstGeom>
+          <a:noFill/>
+        </p:spPr>
+        <p:txBody>
+          <a:bodyPr wrap="square" rtlCol="0">
+            <a:spAutoFit/>
+          </a:bodyPr>
+          <a:lstStyle/>
+          <a:p>
+            <a:pPr algn="ctr"/>
+            <a:r>
+              <a:rPr lang="en-US" dirty="0"/>
+              <a:t>Password:</a:t>
+            </a:r>
+            <a:endParaRPr lang="es-MX" dirty="0"/>
+          </a:p>
+        </p:txBody>
+      </p:sp>
+      <p:sp>
+        <p:nvSpPr>
+          <p:cNvPr id="10" name="Rectángulo 9">
+            <a:extLst>
+              <a:ext uri="{FF2B5EF4-FFF2-40B4-BE49-F238E27FC236}">
+                <a16:creationId xmlns:a16="http://schemas.microsoft.com/office/drawing/2014/main" id="{BF6E47BB-6B20-D7BA-7612-E4530C6A5652}"/>
+              </a:ext>
+            </a:extLst>
+          </p:cNvPr>
+          <p:cNvSpPr/>
+          <p:nvPr/>
+        </p:nvSpPr>
+        <p:spPr>
+          <a:xfrm>
+            <a:off x="5689600" y="4040943"/>
+            <a:ext cx="2667000" cy="552450"/>
+          </a:xfrm>
+          <a:prstGeom prst="rect">
+            <a:avLst/>
+          </a:prstGeom>
+        </p:spPr>
+        <p:style>
+          <a:lnRef idx="2">
+            <a:schemeClr val="accent2"/>
+          </a:lnRef>
+          <a:fillRef idx="1">
+            <a:schemeClr val="lt1"/>
+          </a:fillRef>
+          <a:effectRef idx="0">
+            <a:schemeClr val="accent2"/>
+          </a:effectRef>
+          <a:fontRef idx="minor">
+            <a:schemeClr val="dk1"/>
+          </a:fontRef>
+        </p:style>
+        <p:txBody>
+          <a:bodyPr rtlCol="0" anchor="ctr"/>
+          <a:lstStyle/>
+          <a:p>
+            <a:pPr algn="ctr"/>
+            <a:r>
+              <a:rPr lang="en-US" dirty="0"/>
+              <a:t>*********</a:t>
+            </a:r>
+            <a:endParaRPr lang="es-MX" dirty="0"/>
+          </a:p>
+        </p:txBody>
+      </p:sp>
+      <p:sp>
+        <p:nvSpPr>
+          <p:cNvPr id="11" name="Rectángulo: esquinas redondeadas 10">
+            <a:extLst>
+              <a:ext uri="{FF2B5EF4-FFF2-40B4-BE49-F238E27FC236}">
+                <a16:creationId xmlns:a16="http://schemas.microsoft.com/office/drawing/2014/main" id="{0BFDB422-B53C-82DB-F75B-B0BB488604CD}"/>
+              </a:ext>
+            </a:extLst>
+          </p:cNvPr>
+          <p:cNvSpPr/>
+          <p:nvPr/>
+        </p:nvSpPr>
+        <p:spPr>
+          <a:xfrm>
+            <a:off x="5006975" y="5400338"/>
+            <a:ext cx="2286000" cy="552450"/>
+          </a:xfrm>
+          <a:prstGeom prst="roundRect">
+            <a:avLst/>
+          </a:prstGeom>
+        </p:spPr>
+        <p:style>
+          <a:lnRef idx="2">
+            <a:schemeClr val="accent1">
+              <a:shade val="15000"/>
+            </a:schemeClr>
+          </a:lnRef>
+          <a:fillRef idx="1">
+            <a:schemeClr val="accent1"/>
+          </a:fillRef>
+          <a:effectRef idx="0">
+            <a:schemeClr val="accent1"/>
+          </a:effectRef>
+          <a:fontRef idx="minor">
+            <a:schemeClr val="lt1"/>
+          </a:fontRef>
+        </p:style>
+        <p:txBody>
+          <a:bodyPr rtlCol="0" anchor="ctr"/>
+          <a:lstStyle/>
+          <a:p>
+            <a:pPr algn="ctr"/>
+            <a:r>
+              <a:rPr lang="en-US" dirty="0" err="1"/>
+              <a:t>Ingresar</a:t>
+            </a:r>
+            <a:endParaRPr lang="es-MX" dirty="0"/>
+          </a:p>
+        </p:txBody>
+      </p:sp>
+      <p:sp>
+        <p:nvSpPr>
+          <p:cNvPr id="12" name="CuadroTexto 11">
+            <a:extLst>
+              <a:ext uri="{FF2B5EF4-FFF2-40B4-BE49-F238E27FC236}">
+                <a16:creationId xmlns:a16="http://schemas.microsoft.com/office/drawing/2014/main" id="{718375BF-D746-BA79-41E2-8F841B710C18}"/>
+              </a:ext>
+            </a:extLst>
+          </p:cNvPr>
+          <p:cNvSpPr txBox="1"/>
+          <p:nvPr/>
+        </p:nvSpPr>
+        <p:spPr>
+          <a:xfrm>
+            <a:off x="4019550" y="6966098"/>
+            <a:ext cx="1974850" cy="369332"/>
+          </a:xfrm>
+          <a:prstGeom prst="rect">
+            <a:avLst/>
+          </a:prstGeom>
+          <a:noFill/>
+        </p:spPr>
+        <p:txBody>
+          <a:bodyPr wrap="square" rtlCol="0">
+            <a:spAutoFit/>
+          </a:bodyPr>
+          <a:lstStyle/>
+          <a:p>
+            <a:pPr algn="ctr"/>
+            <a:r>
+              <a:rPr lang="en-US" dirty="0" err="1"/>
+              <a:t>Resgistrate</a:t>
+            </a:r>
+            <a:r>
+              <a:rPr lang="en-US" dirty="0"/>
+              <a:t>!</a:t>
+            </a:r>
+            <a:endParaRPr lang="es-MX" dirty="0"/>
+          </a:p>
+        </p:txBody>
+      </p:sp>
+      <p:sp>
+        <p:nvSpPr>
+          <p:cNvPr id="13" name="CuadroTexto 12">
+            <a:extLst>
+              <a:ext uri="{FF2B5EF4-FFF2-40B4-BE49-F238E27FC236}">
+                <a16:creationId xmlns:a16="http://schemas.microsoft.com/office/drawing/2014/main" id="{5A04AF5E-4C79-2AE7-C42C-F2E786F1954E}"/>
+              </a:ext>
+            </a:extLst>
+          </p:cNvPr>
+          <p:cNvSpPr txBox="1"/>
+          <p:nvPr/>
+        </p:nvSpPr>
+        <p:spPr>
+          <a:xfrm>
+            <a:off x="6496050" y="6966098"/>
+            <a:ext cx="1974850" cy="646331"/>
+          </a:xfrm>
+          <a:prstGeom prst="rect">
+            <a:avLst/>
+          </a:prstGeom>
+          <a:noFill/>
+        </p:spPr>
+        <p:txBody>
+          <a:bodyPr wrap="square" rtlCol="0">
+            <a:spAutoFit/>
+          </a:bodyPr>
+          <a:lstStyle/>
+          <a:p>
+            <a:pPr algn="ctr"/>
+            <a:r>
+              <a:rPr lang="en-US" dirty="0" err="1"/>
+              <a:t>Olvido</a:t>
+            </a:r>
+            <a:r>
+              <a:rPr lang="en-US" dirty="0"/>
+              <a:t> </a:t>
+            </a:r>
+            <a:r>
+              <a:rPr lang="en-US" dirty="0" err="1"/>
+              <a:t>su</a:t>
+            </a:r>
+            <a:r>
+              <a:rPr lang="en-US" dirty="0"/>
+              <a:t> </a:t>
+            </a:r>
+            <a:r>
+              <a:rPr lang="en-US" dirty="0" err="1"/>
+              <a:t>Contrasena</a:t>
+            </a:r>
+            <a:r>
+              <a:rPr lang="en-US" dirty="0"/>
+              <a:t>?</a:t>
+            </a:r>
+            <a:endParaRPr lang="es-MX" dirty="0"/>
+          </a:p>
+        </p:txBody>
+      </p:sp>
+      <p:sp>
+        <p:nvSpPr>
+          <p:cNvPr id="14" name="Rectángulo 13">
+            <a:extLst>
+              <a:ext uri="{FF2B5EF4-FFF2-40B4-BE49-F238E27FC236}">
+                <a16:creationId xmlns:a16="http://schemas.microsoft.com/office/drawing/2014/main" id="{8A58EB39-6109-2167-1706-94BD6B5CB0B2}"/>
+              </a:ext>
+            </a:extLst>
+          </p:cNvPr>
+          <p:cNvSpPr/>
+          <p:nvPr/>
+        </p:nvSpPr>
+        <p:spPr>
+          <a:xfrm>
+            <a:off x="755098" y="2106732"/>
+            <a:ext cx="1447800" cy="1603946"/>
+          </a:xfrm>
+          <a:prstGeom prst="rect">
+            <a:avLst/>
+          </a:prstGeom>
+        </p:spPr>
+        <p:style>
+          <a:lnRef idx="1">
+            <a:schemeClr val="accent1"/>
+          </a:lnRef>
+          <a:fillRef idx="2">
+            <a:schemeClr val="accent1"/>
+          </a:fillRef>
+          <a:effectRef idx="1">
+            <a:schemeClr val="accent1"/>
+          </a:effectRef>
+          <a:fontRef idx="minor">
+            <a:schemeClr val="dk1"/>
+          </a:fontRef>
+        </p:style>
+        <p:txBody>
+          <a:bodyPr rtlCol="0" anchor="ctr"/>
+          <a:lstStyle/>
+          <a:p>
+            <a:pPr algn="ctr"/>
+            <a:r>
+              <a:rPr lang="en-US" dirty="0">
+                <a:solidFill>
+                  <a:schemeClr val="bg1"/>
+                </a:solidFill>
+              </a:rPr>
+              <a:t>Labels</a:t>
+            </a:r>
+          </a:p>
+          <a:p>
+            <a:pPr algn="ctr"/>
+            <a:r>
+              <a:rPr lang="en-US" sz="1200" i="1" dirty="0">
+                <a:solidFill>
+                  <a:schemeClr val="bg1"/>
+                </a:solidFill>
+              </a:rPr>
+              <a:t>Para </a:t>
+            </a:r>
+            <a:r>
+              <a:rPr lang="en-US" sz="1200" i="1" dirty="0" err="1">
+                <a:solidFill>
+                  <a:schemeClr val="bg1"/>
+                </a:solidFill>
+              </a:rPr>
+              <a:t>indicarle</a:t>
+            </a:r>
+            <a:r>
+              <a:rPr lang="en-US" sz="1200" i="1" dirty="0">
+                <a:solidFill>
+                  <a:schemeClr val="bg1"/>
+                </a:solidFill>
+              </a:rPr>
+              <a:t> al </a:t>
+            </a:r>
+            <a:r>
+              <a:rPr lang="en-US" sz="1200" i="1" dirty="0" err="1">
+                <a:solidFill>
+                  <a:schemeClr val="bg1"/>
+                </a:solidFill>
+              </a:rPr>
+              <a:t>usuario</a:t>
+            </a:r>
+            <a:r>
+              <a:rPr lang="en-US" sz="1200" i="1" dirty="0">
+                <a:solidFill>
+                  <a:schemeClr val="bg1"/>
+                </a:solidFill>
+              </a:rPr>
+              <a:t> </a:t>
+            </a:r>
+            <a:r>
+              <a:rPr lang="en-US" sz="1200" i="1" dirty="0" err="1">
+                <a:solidFill>
+                  <a:schemeClr val="bg1"/>
+                </a:solidFill>
+              </a:rPr>
+              <a:t>el</a:t>
+            </a:r>
+            <a:r>
+              <a:rPr lang="en-US" sz="1200" i="1" dirty="0">
+                <a:solidFill>
+                  <a:schemeClr val="bg1"/>
+                </a:solidFill>
+              </a:rPr>
+              <a:t> </a:t>
+            </a:r>
+            <a:r>
+              <a:rPr lang="en-US" sz="1200" i="1" dirty="0" err="1">
+                <a:solidFill>
+                  <a:schemeClr val="bg1"/>
+                </a:solidFill>
+              </a:rPr>
+              <a:t>tipo</a:t>
+            </a:r>
+            <a:r>
+              <a:rPr lang="en-US" sz="1200" i="1" dirty="0">
+                <a:solidFill>
+                  <a:schemeClr val="bg1"/>
+                </a:solidFill>
+              </a:rPr>
+              <a:t> de campo.</a:t>
+            </a:r>
+            <a:endParaRPr lang="es-MX" sz="1200" i="1" dirty="0">
+              <a:solidFill>
+                <a:schemeClr val="bg1"/>
+              </a:solidFill>
+            </a:endParaRPr>
+          </a:p>
+        </p:txBody>
+      </p:sp>
+      <p:cxnSp>
+        <p:nvCxnSpPr>
+          <p:cNvPr id="16" name="Conector recto de flecha 15">
+            <a:extLst>
+              <a:ext uri="{FF2B5EF4-FFF2-40B4-BE49-F238E27FC236}">
+                <a16:creationId xmlns:a16="http://schemas.microsoft.com/office/drawing/2014/main" id="{052D2B97-42FD-6DB3-24CC-EB3922AAD971}"/>
+              </a:ext>
+            </a:extLst>
+          </p:cNvPr>
+          <p:cNvCxnSpPr>
+            <a:cxnSpLocks/>
+            <a:stCxn id="14" idx="3"/>
+            <a:endCxn id="3" idx="1"/>
+          </p:cNvCxnSpPr>
+          <p:nvPr/>
+        </p:nvCxnSpPr>
+        <p:spPr>
+          <a:xfrm>
+            <a:off x="2202898" y="2908705"/>
+            <a:ext cx="1302302" cy="164935"/>
+          </a:xfrm>
+          <a:prstGeom prst="straightConnector1">
+            <a:avLst/>
+          </a:prstGeom>
+          <a:ln>
+            <a:tailEnd type="triangle"/>
+          </a:ln>
+        </p:spPr>
+        <p:style>
+          <a:lnRef idx="1">
+            <a:schemeClr val="accent1"/>
+          </a:lnRef>
+          <a:fillRef idx="0">
+            <a:schemeClr val="accent1"/>
+          </a:fillRef>
+          <a:effectRef idx="0">
+            <a:schemeClr val="accent1"/>
+          </a:effectRef>
+          <a:fontRef idx="minor">
+            <a:schemeClr val="tx1"/>
+          </a:fontRef>
+        </p:style>
+      </p:cxnSp>
+      <p:cxnSp>
+        <p:nvCxnSpPr>
+          <p:cNvPr id="17" name="Conector recto de flecha 16">
+            <a:extLst>
+              <a:ext uri="{FF2B5EF4-FFF2-40B4-BE49-F238E27FC236}">
+                <a16:creationId xmlns:a16="http://schemas.microsoft.com/office/drawing/2014/main" id="{97B8D86C-2244-CB03-7AAD-EAD280553E60}"/>
+              </a:ext>
+            </a:extLst>
+          </p:cNvPr>
+          <p:cNvCxnSpPr>
+            <a:cxnSpLocks/>
+            <a:stCxn id="14" idx="3"/>
+            <a:endCxn id="6" idx="1"/>
+          </p:cNvCxnSpPr>
+          <p:nvPr/>
+        </p:nvCxnSpPr>
+        <p:spPr>
+          <a:xfrm>
+            <a:off x="2202898" y="2908705"/>
+            <a:ext cx="1372152" cy="1405528"/>
+          </a:xfrm>
+          <a:prstGeom prst="straightConnector1">
+            <a:avLst/>
+          </a:prstGeom>
+          <a:ln>
+            <a:tailEnd type="triangle"/>
+          </a:ln>
+        </p:spPr>
+        <p:style>
+          <a:lnRef idx="1">
+            <a:schemeClr val="accent1"/>
+          </a:lnRef>
+          <a:fillRef idx="0">
+            <a:schemeClr val="accent1"/>
+          </a:fillRef>
+          <a:effectRef idx="0">
+            <a:schemeClr val="accent1"/>
+          </a:effectRef>
+          <a:fontRef idx="minor">
+            <a:schemeClr val="tx1"/>
+          </a:fontRef>
+        </p:style>
+      </p:cxnSp>
+      <p:sp>
+        <p:nvSpPr>
+          <p:cNvPr id="28" name="Rectángulo 27">
+            <a:extLst>
+              <a:ext uri="{FF2B5EF4-FFF2-40B4-BE49-F238E27FC236}">
+                <a16:creationId xmlns:a16="http://schemas.microsoft.com/office/drawing/2014/main" id="{8D99F1D1-80DC-6A13-6B34-BF4E56359E97}"/>
+              </a:ext>
+            </a:extLst>
+          </p:cNvPr>
+          <p:cNvSpPr/>
+          <p:nvPr/>
+        </p:nvSpPr>
+        <p:spPr>
+          <a:xfrm>
+            <a:off x="9724058" y="1804417"/>
+            <a:ext cx="2124159" cy="2694482"/>
+          </a:xfrm>
+          <a:prstGeom prst="rect">
+            <a:avLst/>
+          </a:prstGeom>
+        </p:spPr>
+        <p:style>
+          <a:lnRef idx="1">
+            <a:schemeClr val="accent1"/>
+          </a:lnRef>
+          <a:fillRef idx="2">
+            <a:schemeClr val="accent1"/>
+          </a:fillRef>
+          <a:effectRef idx="1">
+            <a:schemeClr val="accent1"/>
+          </a:effectRef>
+          <a:fontRef idx="minor">
+            <a:schemeClr val="dk1"/>
+          </a:fontRef>
+        </p:style>
+        <p:txBody>
+          <a:bodyPr rtlCol="0" anchor="ctr"/>
+          <a:lstStyle/>
+          <a:p>
+            <a:pPr algn="ctr"/>
+            <a:r>
+              <a:rPr lang="en-US" dirty="0">
+                <a:solidFill>
+                  <a:schemeClr val="bg1"/>
+                </a:solidFill>
+              </a:rPr>
+              <a:t>Input de </a:t>
+            </a:r>
+            <a:r>
+              <a:rPr lang="en-US" dirty="0" err="1">
+                <a:solidFill>
+                  <a:schemeClr val="bg1"/>
+                </a:solidFill>
+              </a:rPr>
+              <a:t>Usuario</a:t>
+            </a:r>
+            <a:r>
+              <a:rPr lang="en-US" dirty="0">
+                <a:solidFill>
+                  <a:schemeClr val="bg1"/>
+                </a:solidFill>
+              </a:rPr>
+              <a:t>:</a:t>
+            </a:r>
+            <a:br>
+              <a:rPr lang="en-US" dirty="0">
+                <a:solidFill>
+                  <a:schemeClr val="bg1"/>
+                </a:solidFill>
+              </a:rPr>
+            </a:br>
+            <a:endParaRPr lang="en-US" dirty="0">
+              <a:solidFill>
+                <a:schemeClr val="bg1"/>
+              </a:solidFill>
+            </a:endParaRPr>
+          </a:p>
+          <a:p>
+            <a:pPr marL="171450" indent="-171450" algn="ctr">
+              <a:buFont typeface="Arial" panose="020B0604020202020204" pitchFamily="34" charset="0"/>
+              <a:buChar char="•"/>
+            </a:pPr>
+            <a:r>
+              <a:rPr lang="en-US" sz="1200" dirty="0">
+                <a:solidFill>
+                  <a:schemeClr val="bg1"/>
+                </a:solidFill>
+              </a:rPr>
+              <a:t>Es </a:t>
+            </a:r>
+            <a:r>
+              <a:rPr lang="en-US" sz="1200" dirty="0" err="1">
+                <a:solidFill>
+                  <a:schemeClr val="bg1"/>
+                </a:solidFill>
+              </a:rPr>
+              <a:t>requerido</a:t>
+            </a:r>
+            <a:r>
+              <a:rPr lang="en-US" sz="1200" dirty="0">
+                <a:solidFill>
+                  <a:schemeClr val="bg1"/>
+                </a:solidFill>
+              </a:rPr>
+              <a:t>.</a:t>
+            </a:r>
+          </a:p>
+          <a:p>
+            <a:pPr marL="171450" indent="-171450" algn="ctr">
+              <a:buFont typeface="Arial" panose="020B0604020202020204" pitchFamily="34" charset="0"/>
+              <a:buChar char="•"/>
+            </a:pPr>
+            <a:r>
+              <a:rPr lang="en-US" sz="1200" dirty="0">
+                <a:solidFill>
+                  <a:schemeClr val="bg1"/>
+                </a:solidFill>
+              </a:rPr>
+              <a:t>De </a:t>
+            </a:r>
+            <a:r>
+              <a:rPr lang="en-US" sz="1200" dirty="0" err="1">
+                <a:solidFill>
+                  <a:schemeClr val="bg1"/>
+                </a:solidFill>
+              </a:rPr>
+              <a:t>tipo</a:t>
+            </a:r>
+            <a:r>
+              <a:rPr lang="en-US" sz="1200" dirty="0">
+                <a:solidFill>
+                  <a:schemeClr val="bg1"/>
+                </a:solidFill>
+              </a:rPr>
+              <a:t> </a:t>
+            </a:r>
+            <a:r>
+              <a:rPr lang="en-US" sz="1200" dirty="0" err="1">
+                <a:solidFill>
+                  <a:schemeClr val="bg1"/>
+                </a:solidFill>
+              </a:rPr>
+              <a:t>Texto</a:t>
+            </a:r>
+            <a:endParaRPr lang="en-US" sz="1200" dirty="0">
+              <a:solidFill>
+                <a:schemeClr val="bg1"/>
+              </a:solidFill>
+            </a:endParaRPr>
+          </a:p>
+          <a:p>
+            <a:pPr marL="171450" indent="-171450" algn="ctr">
+              <a:buFont typeface="Arial" panose="020B0604020202020204" pitchFamily="34" charset="0"/>
+              <a:buChar char="•"/>
+            </a:pPr>
+            <a:r>
+              <a:rPr lang="en-US" sz="1200" dirty="0">
+                <a:solidFill>
+                  <a:schemeClr val="bg1"/>
+                </a:solidFill>
+              </a:rPr>
+              <a:t>Puede </a:t>
+            </a:r>
+            <a:r>
+              <a:rPr lang="en-US" sz="1200" dirty="0" err="1">
+                <a:solidFill>
+                  <a:schemeClr val="bg1"/>
+                </a:solidFill>
+              </a:rPr>
+              <a:t>aceptar</a:t>
+            </a:r>
+            <a:r>
+              <a:rPr lang="en-US" sz="1200" dirty="0">
+                <a:solidFill>
+                  <a:schemeClr val="bg1"/>
+                </a:solidFill>
+              </a:rPr>
+              <a:t> </a:t>
+            </a:r>
+            <a:r>
+              <a:rPr lang="en-US" sz="1200" dirty="0" err="1">
+                <a:solidFill>
+                  <a:schemeClr val="bg1"/>
+                </a:solidFill>
+              </a:rPr>
+              <a:t>cualquier</a:t>
+            </a:r>
+            <a:r>
+              <a:rPr lang="en-US" sz="1200" dirty="0">
+                <a:solidFill>
+                  <a:schemeClr val="bg1"/>
+                </a:solidFill>
+              </a:rPr>
+              <a:t> </a:t>
+            </a:r>
+            <a:r>
+              <a:rPr lang="en-US" sz="1200" dirty="0" err="1">
+                <a:solidFill>
+                  <a:schemeClr val="bg1"/>
+                </a:solidFill>
+              </a:rPr>
+              <a:t>tipo</a:t>
+            </a:r>
+            <a:r>
+              <a:rPr lang="en-US" sz="1200" dirty="0">
+                <a:solidFill>
+                  <a:schemeClr val="bg1"/>
+                </a:solidFill>
+              </a:rPr>
+              <a:t> de </a:t>
+            </a:r>
+            <a:r>
+              <a:rPr lang="en-US" sz="1200" dirty="0" err="1">
+                <a:solidFill>
+                  <a:schemeClr val="bg1"/>
+                </a:solidFill>
+              </a:rPr>
+              <a:t>caracteres</a:t>
+            </a:r>
+            <a:r>
+              <a:rPr lang="en-US" sz="1200" dirty="0">
+                <a:solidFill>
+                  <a:schemeClr val="bg1"/>
+                </a:solidFill>
+              </a:rPr>
+              <a:t> </a:t>
+            </a:r>
+            <a:r>
+              <a:rPr lang="en-US" sz="1200" dirty="0" err="1">
+                <a:solidFill>
+                  <a:schemeClr val="bg1"/>
+                </a:solidFill>
+              </a:rPr>
+              <a:t>si</a:t>
+            </a:r>
+            <a:r>
+              <a:rPr lang="en-US" sz="1200" dirty="0">
+                <a:solidFill>
+                  <a:schemeClr val="bg1"/>
+                </a:solidFill>
+              </a:rPr>
+              <a:t> </a:t>
+            </a:r>
+            <a:r>
+              <a:rPr lang="en-US" sz="1200" dirty="0" err="1">
+                <a:solidFill>
+                  <a:schemeClr val="bg1"/>
+                </a:solidFill>
+              </a:rPr>
+              <a:t>ingresa</a:t>
+            </a:r>
+            <a:r>
+              <a:rPr lang="en-US" sz="1200" dirty="0">
+                <a:solidFill>
+                  <a:schemeClr val="bg1"/>
+                </a:solidFill>
+              </a:rPr>
+              <a:t> un </a:t>
+            </a:r>
+            <a:r>
+              <a:rPr lang="en-US" sz="1200" dirty="0" err="1">
+                <a:solidFill>
+                  <a:schemeClr val="bg1"/>
+                </a:solidFill>
+              </a:rPr>
+              <a:t>nombre</a:t>
+            </a:r>
+            <a:r>
+              <a:rPr lang="en-US" sz="1200" dirty="0">
+                <a:solidFill>
+                  <a:schemeClr val="bg1"/>
+                </a:solidFill>
+              </a:rPr>
+              <a:t> de </a:t>
+            </a:r>
+            <a:r>
+              <a:rPr lang="en-US" sz="1200" dirty="0" err="1">
+                <a:solidFill>
+                  <a:schemeClr val="bg1"/>
+                </a:solidFill>
+              </a:rPr>
+              <a:t>usuario</a:t>
+            </a:r>
+            <a:r>
+              <a:rPr lang="en-US" sz="1200" dirty="0">
+                <a:solidFill>
+                  <a:schemeClr val="bg1"/>
+                </a:solidFill>
+              </a:rPr>
+              <a:t> o se lo </a:t>
+            </a:r>
+            <a:r>
+              <a:rPr lang="en-US" sz="1200" dirty="0" err="1">
+                <a:solidFill>
+                  <a:schemeClr val="bg1"/>
+                </a:solidFill>
+              </a:rPr>
+              <a:t>contrario</a:t>
+            </a:r>
+            <a:r>
+              <a:rPr lang="en-US" sz="1200" dirty="0">
+                <a:solidFill>
+                  <a:schemeClr val="bg1"/>
+                </a:solidFill>
+              </a:rPr>
+              <a:t> </a:t>
+            </a:r>
+            <a:r>
+              <a:rPr lang="en-US" sz="1200" dirty="0" err="1">
+                <a:solidFill>
+                  <a:schemeClr val="bg1"/>
+                </a:solidFill>
+              </a:rPr>
+              <a:t>correo</a:t>
+            </a:r>
+            <a:r>
+              <a:rPr lang="en-US" sz="1200" dirty="0">
+                <a:solidFill>
+                  <a:schemeClr val="bg1"/>
+                </a:solidFill>
+              </a:rPr>
+              <a:t> </a:t>
+            </a:r>
+            <a:r>
+              <a:rPr lang="en-US" sz="1200" dirty="0" err="1">
+                <a:solidFill>
+                  <a:schemeClr val="bg1"/>
+                </a:solidFill>
+              </a:rPr>
+              <a:t>electronico</a:t>
+            </a:r>
+            <a:r>
+              <a:rPr lang="en-US" sz="1200" dirty="0">
+                <a:solidFill>
+                  <a:schemeClr val="bg1"/>
+                </a:solidFill>
+              </a:rPr>
+              <a:t>.</a:t>
+            </a:r>
+          </a:p>
+          <a:p>
+            <a:pPr marL="171450" indent="-171450" algn="ctr">
+              <a:buFont typeface="Arial" panose="020B0604020202020204" pitchFamily="34" charset="0"/>
+              <a:buChar char="•"/>
+            </a:pPr>
+            <a:r>
+              <a:rPr lang="en-US" sz="1200" dirty="0">
+                <a:solidFill>
+                  <a:schemeClr val="bg1"/>
+                </a:solidFill>
+              </a:rPr>
+              <a:t>No </a:t>
+            </a:r>
+            <a:r>
+              <a:rPr lang="en-US" sz="1200" dirty="0" err="1">
+                <a:solidFill>
+                  <a:schemeClr val="bg1"/>
+                </a:solidFill>
+              </a:rPr>
+              <a:t>tiene</a:t>
+            </a:r>
+            <a:r>
+              <a:rPr lang="en-US" sz="1200" dirty="0">
+                <a:solidFill>
+                  <a:schemeClr val="bg1"/>
+                </a:solidFill>
+              </a:rPr>
+              <a:t> longitude maxima</a:t>
+            </a:r>
+            <a:endParaRPr lang="es-MX" sz="1200" dirty="0">
+              <a:solidFill>
+                <a:schemeClr val="bg1"/>
+              </a:solidFill>
+            </a:endParaRPr>
+          </a:p>
+        </p:txBody>
+      </p:sp>
+      <p:cxnSp>
+        <p:nvCxnSpPr>
+          <p:cNvPr id="29" name="Conector recto de flecha 28">
+            <a:extLst>
+              <a:ext uri="{FF2B5EF4-FFF2-40B4-BE49-F238E27FC236}">
+                <a16:creationId xmlns:a16="http://schemas.microsoft.com/office/drawing/2014/main" id="{455667B5-C13A-F0DD-E073-1E64780F1E97}"/>
+              </a:ext>
+            </a:extLst>
+          </p:cNvPr>
+          <p:cNvCxnSpPr>
+            <a:cxnSpLocks/>
+            <a:stCxn id="28" idx="1"/>
+            <a:endCxn id="4" idx="3"/>
+          </p:cNvCxnSpPr>
+          <p:nvPr/>
+        </p:nvCxnSpPr>
+        <p:spPr>
+          <a:xfrm flipH="1" flipV="1">
+            <a:off x="8286750" y="3076575"/>
+            <a:ext cx="1437308" cy="75083"/>
+          </a:xfrm>
+          <a:prstGeom prst="straightConnector1">
+            <a:avLst/>
+          </a:prstGeom>
+          <a:ln>
+            <a:tailEnd type="triangle"/>
+          </a:ln>
+        </p:spPr>
+        <p:style>
+          <a:lnRef idx="1">
+            <a:schemeClr val="accent1"/>
+          </a:lnRef>
+          <a:fillRef idx="0">
+            <a:schemeClr val="accent1"/>
+          </a:fillRef>
+          <a:effectRef idx="0">
+            <a:schemeClr val="accent1"/>
+          </a:effectRef>
+          <a:fontRef idx="minor">
+            <a:schemeClr val="tx1"/>
+          </a:fontRef>
+        </p:style>
+      </p:cxnSp>
+      <p:sp>
+        <p:nvSpPr>
+          <p:cNvPr id="34" name="Rectángulo 33">
+            <a:extLst>
+              <a:ext uri="{FF2B5EF4-FFF2-40B4-BE49-F238E27FC236}">
+                <a16:creationId xmlns:a16="http://schemas.microsoft.com/office/drawing/2014/main" id="{1A3C512F-027D-6A84-7639-4F04E1301D34}"/>
+              </a:ext>
+            </a:extLst>
+          </p:cNvPr>
+          <p:cNvSpPr/>
+          <p:nvPr/>
+        </p:nvSpPr>
+        <p:spPr>
+          <a:xfrm>
+            <a:off x="9711800" y="4862252"/>
+            <a:ext cx="2124159" cy="2694482"/>
+          </a:xfrm>
+          <a:prstGeom prst="rect">
+            <a:avLst/>
+          </a:prstGeom>
+        </p:spPr>
+        <p:style>
+          <a:lnRef idx="1">
+            <a:schemeClr val="accent1"/>
+          </a:lnRef>
+          <a:fillRef idx="2">
+            <a:schemeClr val="accent1"/>
+          </a:fillRef>
+          <a:effectRef idx="1">
+            <a:schemeClr val="accent1"/>
+          </a:effectRef>
+          <a:fontRef idx="minor">
+            <a:schemeClr val="dk1"/>
+          </a:fontRef>
+        </p:style>
+        <p:txBody>
+          <a:bodyPr rtlCol="0" anchor="ctr"/>
+          <a:lstStyle/>
+          <a:p>
+            <a:pPr algn="ctr"/>
+            <a:r>
+              <a:rPr lang="en-US" dirty="0">
+                <a:solidFill>
+                  <a:schemeClr val="bg1"/>
+                </a:solidFill>
+              </a:rPr>
+              <a:t>Input de Password:</a:t>
+            </a:r>
+            <a:br>
+              <a:rPr lang="en-US" dirty="0">
+                <a:solidFill>
+                  <a:schemeClr val="bg1"/>
+                </a:solidFill>
+              </a:rPr>
+            </a:br>
+            <a:endParaRPr lang="en-US" dirty="0">
+              <a:solidFill>
+                <a:schemeClr val="bg1"/>
+              </a:solidFill>
+            </a:endParaRPr>
+          </a:p>
+          <a:p>
+            <a:pPr marL="171450" indent="-171450" algn="ctr">
+              <a:buFont typeface="Arial" panose="020B0604020202020204" pitchFamily="34" charset="0"/>
+              <a:buChar char="•"/>
+            </a:pPr>
+            <a:r>
+              <a:rPr lang="en-US" sz="1200" dirty="0">
+                <a:solidFill>
+                  <a:schemeClr val="bg1"/>
+                </a:solidFill>
+              </a:rPr>
+              <a:t>Es </a:t>
+            </a:r>
+            <a:r>
+              <a:rPr lang="en-US" sz="1200" dirty="0" err="1">
+                <a:solidFill>
+                  <a:schemeClr val="bg1"/>
+                </a:solidFill>
+              </a:rPr>
+              <a:t>requerido</a:t>
+            </a:r>
+            <a:r>
+              <a:rPr lang="en-US" sz="1200" dirty="0">
+                <a:solidFill>
+                  <a:schemeClr val="bg1"/>
+                </a:solidFill>
+              </a:rPr>
+              <a:t>.</a:t>
+            </a:r>
+          </a:p>
+          <a:p>
+            <a:pPr marL="171450" indent="-171450" algn="ctr">
+              <a:buFont typeface="Arial" panose="020B0604020202020204" pitchFamily="34" charset="0"/>
+              <a:buChar char="•"/>
+            </a:pPr>
+            <a:r>
+              <a:rPr lang="en-US" sz="1200" dirty="0">
+                <a:solidFill>
+                  <a:schemeClr val="bg1"/>
+                </a:solidFill>
+              </a:rPr>
+              <a:t>De </a:t>
+            </a:r>
+            <a:r>
+              <a:rPr lang="en-US" sz="1200" dirty="0" err="1">
+                <a:solidFill>
+                  <a:schemeClr val="bg1"/>
+                </a:solidFill>
+              </a:rPr>
+              <a:t>tipo</a:t>
+            </a:r>
+            <a:r>
+              <a:rPr lang="en-US" sz="1200" dirty="0">
+                <a:solidFill>
+                  <a:schemeClr val="bg1"/>
+                </a:solidFill>
+              </a:rPr>
+              <a:t> password</a:t>
+            </a:r>
+          </a:p>
+          <a:p>
+            <a:pPr marL="171450" indent="-171450" algn="ctr">
+              <a:buFont typeface="Arial" panose="020B0604020202020204" pitchFamily="34" charset="0"/>
+              <a:buChar char="•"/>
+            </a:pPr>
+            <a:r>
+              <a:rPr lang="en-US" sz="1200" dirty="0" err="1">
+                <a:solidFill>
+                  <a:schemeClr val="bg1"/>
+                </a:solidFill>
+              </a:rPr>
+              <a:t>Minimo</a:t>
+            </a:r>
+            <a:r>
+              <a:rPr lang="en-US" sz="1200" dirty="0">
+                <a:solidFill>
+                  <a:schemeClr val="bg1"/>
+                </a:solidFill>
+              </a:rPr>
+              <a:t> 8 </a:t>
+            </a:r>
+            <a:r>
+              <a:rPr lang="en-US" sz="1200" dirty="0" err="1">
+                <a:solidFill>
+                  <a:schemeClr val="bg1"/>
+                </a:solidFill>
+              </a:rPr>
+              <a:t>caracteres</a:t>
+            </a:r>
+            <a:endParaRPr lang="en-US" sz="1200" dirty="0">
+              <a:solidFill>
+                <a:schemeClr val="bg1"/>
+              </a:solidFill>
+            </a:endParaRPr>
+          </a:p>
+          <a:p>
+            <a:pPr marL="171450" indent="-171450" algn="ctr">
+              <a:buFont typeface="Arial" panose="020B0604020202020204" pitchFamily="34" charset="0"/>
+              <a:buChar char="•"/>
+            </a:pPr>
+            <a:r>
+              <a:rPr lang="en-US" sz="1200" dirty="0" err="1">
+                <a:solidFill>
+                  <a:schemeClr val="bg1"/>
+                </a:solidFill>
+              </a:rPr>
+              <a:t>Minimo</a:t>
+            </a:r>
+            <a:r>
+              <a:rPr lang="en-US" sz="1200" dirty="0">
+                <a:solidFill>
+                  <a:schemeClr val="bg1"/>
+                </a:solidFill>
+              </a:rPr>
+              <a:t> </a:t>
+            </a:r>
+            <a:r>
+              <a:rPr lang="en-US" sz="1200" dirty="0" err="1">
+                <a:solidFill>
+                  <a:schemeClr val="bg1"/>
+                </a:solidFill>
+              </a:rPr>
+              <a:t>una</a:t>
+            </a:r>
+            <a:r>
+              <a:rPr lang="en-US" sz="1200" dirty="0">
+                <a:solidFill>
+                  <a:schemeClr val="bg1"/>
+                </a:solidFill>
+              </a:rPr>
+              <a:t> </a:t>
+            </a:r>
+            <a:r>
+              <a:rPr lang="en-US" sz="1200" dirty="0" err="1">
+                <a:solidFill>
+                  <a:schemeClr val="bg1"/>
+                </a:solidFill>
+              </a:rPr>
+              <a:t>minuscula</a:t>
+            </a:r>
+            <a:r>
+              <a:rPr lang="en-US" sz="1200" dirty="0">
+                <a:solidFill>
+                  <a:schemeClr val="bg1"/>
+                </a:solidFill>
+              </a:rPr>
+              <a:t>, </a:t>
+            </a:r>
+            <a:r>
+              <a:rPr lang="en-US" sz="1200" dirty="0" err="1">
+                <a:solidFill>
+                  <a:schemeClr val="bg1"/>
+                </a:solidFill>
+              </a:rPr>
+              <a:t>una</a:t>
+            </a:r>
+            <a:r>
+              <a:rPr lang="en-US" sz="1200" dirty="0">
+                <a:solidFill>
+                  <a:schemeClr val="bg1"/>
+                </a:solidFill>
+              </a:rPr>
+              <a:t> </a:t>
+            </a:r>
+            <a:r>
+              <a:rPr lang="en-US" sz="1200" dirty="0" err="1">
+                <a:solidFill>
+                  <a:schemeClr val="bg1"/>
+                </a:solidFill>
+              </a:rPr>
+              <a:t>mayuscula</a:t>
+            </a:r>
+            <a:r>
+              <a:rPr lang="en-US" sz="1200" dirty="0">
+                <a:solidFill>
+                  <a:schemeClr val="bg1"/>
+                </a:solidFill>
+              </a:rPr>
+              <a:t>, un </a:t>
+            </a:r>
+            <a:r>
+              <a:rPr lang="en-US" sz="1200" dirty="0" err="1">
+                <a:solidFill>
+                  <a:schemeClr val="bg1"/>
+                </a:solidFill>
+              </a:rPr>
+              <a:t>numero</a:t>
+            </a:r>
+            <a:r>
+              <a:rPr lang="en-US" sz="1200" dirty="0">
+                <a:solidFill>
+                  <a:schemeClr val="bg1"/>
+                </a:solidFill>
+              </a:rPr>
+              <a:t> y un </a:t>
+            </a:r>
+            <a:r>
+              <a:rPr lang="en-US" sz="1200" dirty="0" err="1">
+                <a:solidFill>
+                  <a:schemeClr val="bg1"/>
+                </a:solidFill>
+              </a:rPr>
+              <a:t>carcter</a:t>
+            </a:r>
+            <a:r>
+              <a:rPr lang="en-US" sz="1200" dirty="0">
+                <a:solidFill>
+                  <a:schemeClr val="bg1"/>
+                </a:solidFill>
+              </a:rPr>
+              <a:t> especial.</a:t>
+            </a:r>
+          </a:p>
+        </p:txBody>
+      </p:sp>
+      <p:cxnSp>
+        <p:nvCxnSpPr>
+          <p:cNvPr id="35" name="Conector recto de flecha 34">
+            <a:extLst>
+              <a:ext uri="{FF2B5EF4-FFF2-40B4-BE49-F238E27FC236}">
+                <a16:creationId xmlns:a16="http://schemas.microsoft.com/office/drawing/2014/main" id="{3F91DEBC-913F-C4EC-C490-7254F9D7D86C}"/>
+              </a:ext>
+            </a:extLst>
+          </p:cNvPr>
+          <p:cNvCxnSpPr>
+            <a:cxnSpLocks/>
+            <a:stCxn id="34" idx="1"/>
+            <a:endCxn id="10" idx="3"/>
+          </p:cNvCxnSpPr>
+          <p:nvPr/>
+        </p:nvCxnSpPr>
+        <p:spPr>
+          <a:xfrm flipH="1" flipV="1">
+            <a:off x="8356600" y="4317168"/>
+            <a:ext cx="1355200" cy="1892325"/>
+          </a:xfrm>
+          <a:prstGeom prst="straightConnector1">
+            <a:avLst/>
+          </a:prstGeom>
+          <a:ln>
+            <a:tailEnd type="triangle"/>
+          </a:ln>
+        </p:spPr>
+        <p:style>
+          <a:lnRef idx="1">
+            <a:schemeClr val="accent1"/>
+          </a:lnRef>
+          <a:fillRef idx="0">
+            <a:schemeClr val="accent1"/>
+          </a:fillRef>
+          <a:effectRef idx="0">
+            <a:schemeClr val="accent1"/>
+          </a:effectRef>
+          <a:fontRef idx="minor">
+            <a:schemeClr val="tx1"/>
+          </a:fontRef>
+        </p:style>
+      </p:cxnSp>
+      <p:sp>
+        <p:nvSpPr>
+          <p:cNvPr id="41" name="Rectángulo 40">
+            <a:extLst>
+              <a:ext uri="{FF2B5EF4-FFF2-40B4-BE49-F238E27FC236}">
+                <a16:creationId xmlns:a16="http://schemas.microsoft.com/office/drawing/2014/main" id="{A52FBA10-0F5F-40B6-2955-4657517739F0}"/>
+              </a:ext>
+            </a:extLst>
+          </p:cNvPr>
+          <p:cNvSpPr/>
+          <p:nvPr/>
+        </p:nvSpPr>
+        <p:spPr>
+          <a:xfrm>
+            <a:off x="615814" y="4484437"/>
+            <a:ext cx="2151683" cy="2263750"/>
+          </a:xfrm>
+          <a:prstGeom prst="rect">
+            <a:avLst/>
+          </a:prstGeom>
+        </p:spPr>
+        <p:style>
+          <a:lnRef idx="1">
+            <a:schemeClr val="accent1"/>
+          </a:lnRef>
+          <a:fillRef idx="2">
+            <a:schemeClr val="accent1"/>
+          </a:fillRef>
+          <a:effectRef idx="1">
+            <a:schemeClr val="accent1"/>
+          </a:effectRef>
+          <a:fontRef idx="minor">
+            <a:schemeClr val="dk1"/>
+          </a:fontRef>
+        </p:style>
+        <p:txBody>
+          <a:bodyPr rtlCol="0" anchor="ctr"/>
+          <a:lstStyle/>
+          <a:p>
+            <a:pPr algn="ctr"/>
+            <a:r>
+              <a:rPr lang="en-US" dirty="0" err="1">
+                <a:solidFill>
+                  <a:schemeClr val="bg1"/>
+                </a:solidFill>
+              </a:rPr>
+              <a:t>Boton</a:t>
+            </a:r>
+            <a:endParaRPr lang="en-US" dirty="0">
+              <a:solidFill>
+                <a:schemeClr val="bg1"/>
+              </a:solidFill>
+            </a:endParaRPr>
+          </a:p>
+          <a:p>
+            <a:pPr algn="ctr"/>
+            <a:endParaRPr lang="en-US" dirty="0">
+              <a:solidFill>
+                <a:schemeClr val="bg1"/>
+              </a:solidFill>
+            </a:endParaRPr>
+          </a:p>
+          <a:p>
+            <a:pPr algn="ctr"/>
+            <a:r>
+              <a:rPr lang="en-US" sz="1000" i="1" dirty="0">
+                <a:solidFill>
+                  <a:schemeClr val="bg1"/>
+                </a:solidFill>
+              </a:rPr>
+              <a:t>Lanza un </a:t>
+            </a:r>
+            <a:r>
+              <a:rPr lang="en-US" sz="1000" i="1" dirty="0" err="1">
+                <a:solidFill>
+                  <a:schemeClr val="bg1"/>
+                </a:solidFill>
+              </a:rPr>
+              <a:t>alerta</a:t>
+            </a:r>
+            <a:r>
+              <a:rPr lang="en-US" sz="1000" i="1" dirty="0">
+                <a:solidFill>
+                  <a:schemeClr val="bg1"/>
+                </a:solidFill>
+              </a:rPr>
+              <a:t> </a:t>
+            </a:r>
+            <a:r>
+              <a:rPr lang="en-US" sz="1000" i="1" dirty="0" err="1">
+                <a:solidFill>
+                  <a:schemeClr val="bg1"/>
+                </a:solidFill>
+              </a:rPr>
+              <a:t>si</a:t>
+            </a:r>
+            <a:r>
+              <a:rPr lang="en-US" sz="1000" i="1" dirty="0">
+                <a:solidFill>
+                  <a:schemeClr val="bg1"/>
+                </a:solidFill>
+              </a:rPr>
+              <a:t> </a:t>
+            </a:r>
+            <a:r>
+              <a:rPr lang="en-US" sz="1000" i="1" dirty="0" err="1">
+                <a:solidFill>
+                  <a:schemeClr val="bg1"/>
+                </a:solidFill>
+              </a:rPr>
+              <a:t>falta</a:t>
+            </a:r>
+            <a:r>
+              <a:rPr lang="en-US" sz="1000" i="1" dirty="0">
+                <a:solidFill>
+                  <a:schemeClr val="bg1"/>
+                </a:solidFill>
+              </a:rPr>
+              <a:t> </a:t>
+            </a:r>
+            <a:r>
+              <a:rPr lang="en-US" sz="1000" i="1" dirty="0" err="1">
+                <a:solidFill>
+                  <a:schemeClr val="bg1"/>
+                </a:solidFill>
+              </a:rPr>
+              <a:t>por</a:t>
+            </a:r>
+            <a:r>
+              <a:rPr lang="en-US" sz="1000" i="1" dirty="0">
+                <a:solidFill>
+                  <a:schemeClr val="bg1"/>
+                </a:solidFill>
+              </a:rPr>
+              <a:t> </a:t>
+            </a:r>
+            <a:r>
+              <a:rPr lang="en-US" sz="1000" i="1" dirty="0" err="1">
+                <a:solidFill>
+                  <a:schemeClr val="bg1"/>
+                </a:solidFill>
+              </a:rPr>
+              <a:t>llenar</a:t>
+            </a:r>
+            <a:r>
+              <a:rPr lang="en-US" sz="1000" i="1" dirty="0">
+                <a:solidFill>
+                  <a:schemeClr val="bg1"/>
+                </a:solidFill>
+              </a:rPr>
+              <a:t> un campo del </a:t>
+            </a:r>
+            <a:r>
+              <a:rPr lang="en-US" sz="1000" i="1" dirty="0" err="1">
+                <a:solidFill>
+                  <a:schemeClr val="bg1"/>
+                </a:solidFill>
+              </a:rPr>
+              <a:t>faormulario</a:t>
+            </a:r>
+            <a:r>
+              <a:rPr lang="en-US" sz="1000" i="1" dirty="0">
+                <a:solidFill>
+                  <a:schemeClr val="bg1"/>
+                </a:solidFill>
+              </a:rPr>
+              <a:t>.</a:t>
+            </a:r>
+          </a:p>
+          <a:p>
+            <a:pPr algn="ctr"/>
+            <a:endParaRPr lang="en-US" sz="1000" i="1" dirty="0">
+              <a:solidFill>
+                <a:schemeClr val="bg1"/>
+              </a:solidFill>
+            </a:endParaRPr>
+          </a:p>
+          <a:p>
+            <a:pPr algn="ctr"/>
+            <a:r>
+              <a:rPr lang="en-US" sz="1000" i="1" dirty="0" err="1">
+                <a:solidFill>
+                  <a:schemeClr val="bg1"/>
+                </a:solidFill>
+              </a:rPr>
+              <a:t>Hace</a:t>
+            </a:r>
+            <a:r>
+              <a:rPr lang="en-US" sz="1000" i="1" dirty="0">
+                <a:solidFill>
+                  <a:schemeClr val="bg1"/>
+                </a:solidFill>
+              </a:rPr>
+              <a:t> la </a:t>
+            </a:r>
+            <a:r>
+              <a:rPr lang="en-US" sz="1000" i="1" dirty="0" err="1">
+                <a:solidFill>
+                  <a:schemeClr val="bg1"/>
+                </a:solidFill>
+              </a:rPr>
+              <a:t>validacion</a:t>
+            </a:r>
+            <a:r>
+              <a:rPr lang="en-US" sz="1000" i="1" dirty="0">
+                <a:solidFill>
+                  <a:schemeClr val="bg1"/>
+                </a:solidFill>
+              </a:rPr>
+              <a:t> de las </a:t>
+            </a:r>
+            <a:r>
+              <a:rPr lang="en-US" sz="1000" i="1" dirty="0" err="1">
+                <a:solidFill>
+                  <a:schemeClr val="bg1"/>
+                </a:solidFill>
+              </a:rPr>
+              <a:t>credenciales</a:t>
+            </a:r>
+            <a:r>
+              <a:rPr lang="en-US" sz="1000" i="1" dirty="0">
+                <a:solidFill>
+                  <a:schemeClr val="bg1"/>
+                </a:solidFill>
+              </a:rPr>
+              <a:t>, </a:t>
+            </a:r>
+            <a:r>
+              <a:rPr lang="en-US" sz="1000" i="1" dirty="0" err="1">
+                <a:solidFill>
+                  <a:schemeClr val="bg1"/>
+                </a:solidFill>
+              </a:rPr>
+              <a:t>si</a:t>
+            </a:r>
+            <a:r>
+              <a:rPr lang="en-US" sz="1000" i="1" dirty="0">
+                <a:solidFill>
+                  <a:schemeClr val="bg1"/>
+                </a:solidFill>
+              </a:rPr>
+              <a:t> </a:t>
+            </a:r>
+            <a:r>
+              <a:rPr lang="en-US" sz="1000" i="1" dirty="0" err="1">
+                <a:solidFill>
+                  <a:schemeClr val="bg1"/>
+                </a:solidFill>
+              </a:rPr>
+              <a:t>estan</a:t>
+            </a:r>
+            <a:r>
+              <a:rPr lang="en-US" sz="1000" i="1" dirty="0">
+                <a:solidFill>
+                  <a:schemeClr val="bg1"/>
+                </a:solidFill>
+              </a:rPr>
+              <a:t> </a:t>
+            </a:r>
+            <a:r>
+              <a:rPr lang="en-US" sz="1000" i="1" dirty="0" err="1">
+                <a:solidFill>
+                  <a:schemeClr val="bg1"/>
+                </a:solidFill>
+              </a:rPr>
+              <a:t>correctas</a:t>
+            </a:r>
+            <a:r>
+              <a:rPr lang="en-US" sz="1000" i="1" dirty="0">
+                <a:solidFill>
+                  <a:schemeClr val="bg1"/>
+                </a:solidFill>
+              </a:rPr>
+              <a:t> le da </a:t>
+            </a:r>
+            <a:r>
+              <a:rPr lang="en-US" sz="1000" i="1" dirty="0" err="1">
+                <a:solidFill>
+                  <a:schemeClr val="bg1"/>
+                </a:solidFill>
+              </a:rPr>
+              <a:t>acceso</a:t>
+            </a:r>
+            <a:r>
+              <a:rPr lang="en-US" sz="1000" i="1" dirty="0">
+                <a:solidFill>
+                  <a:schemeClr val="bg1"/>
+                </a:solidFill>
+              </a:rPr>
+              <a:t> al Sistema, de lo </a:t>
+            </a:r>
+            <a:r>
+              <a:rPr lang="en-US" sz="1000" i="1" dirty="0" err="1">
+                <a:solidFill>
+                  <a:schemeClr val="bg1"/>
+                </a:solidFill>
+              </a:rPr>
+              <a:t>contrario</a:t>
+            </a:r>
+            <a:r>
+              <a:rPr lang="en-US" sz="1000" i="1" dirty="0">
+                <a:solidFill>
+                  <a:schemeClr val="bg1"/>
+                </a:solidFill>
+              </a:rPr>
+              <a:t> se lo </a:t>
+            </a:r>
+            <a:r>
+              <a:rPr lang="en-US" sz="1000" i="1" dirty="0" err="1">
+                <a:solidFill>
+                  <a:schemeClr val="bg1"/>
+                </a:solidFill>
+              </a:rPr>
+              <a:t>denega</a:t>
+            </a:r>
+            <a:r>
+              <a:rPr lang="en-US" sz="1000" i="1" dirty="0">
+                <a:solidFill>
+                  <a:schemeClr val="bg1"/>
+                </a:solidFill>
+              </a:rPr>
+              <a:t> al </a:t>
+            </a:r>
+            <a:r>
+              <a:rPr lang="en-US" sz="1000" i="1" dirty="0" err="1">
+                <a:solidFill>
+                  <a:schemeClr val="bg1"/>
+                </a:solidFill>
+              </a:rPr>
+              <a:t>usuario</a:t>
+            </a:r>
+            <a:endParaRPr lang="en-US" sz="1000" i="1" dirty="0">
+              <a:solidFill>
+                <a:schemeClr val="bg1"/>
+              </a:solidFill>
+            </a:endParaRPr>
+          </a:p>
+          <a:p>
+            <a:pPr algn="ctr"/>
+            <a:endParaRPr lang="en-US" dirty="0">
+              <a:solidFill>
+                <a:schemeClr val="bg1"/>
+              </a:solidFill>
+            </a:endParaRPr>
+          </a:p>
+          <a:p>
+            <a:pPr algn="ctr"/>
+            <a:endParaRPr lang="es-MX" dirty="0">
+              <a:solidFill>
+                <a:schemeClr val="bg1"/>
+              </a:solidFill>
+            </a:endParaRPr>
+          </a:p>
+        </p:txBody>
+      </p:sp>
+      <p:cxnSp>
+        <p:nvCxnSpPr>
+          <p:cNvPr id="46" name="Conector recto de flecha 45">
+            <a:extLst>
+              <a:ext uri="{FF2B5EF4-FFF2-40B4-BE49-F238E27FC236}">
+                <a16:creationId xmlns:a16="http://schemas.microsoft.com/office/drawing/2014/main" id="{5BDA05D0-866F-29B6-12E3-A6D520A9D4B9}"/>
+              </a:ext>
+            </a:extLst>
+          </p:cNvPr>
+          <p:cNvCxnSpPr>
+            <a:cxnSpLocks/>
+            <a:stCxn id="41" idx="3"/>
+            <a:endCxn id="11" idx="1"/>
+          </p:cNvCxnSpPr>
+          <p:nvPr/>
+        </p:nvCxnSpPr>
+        <p:spPr>
+          <a:xfrm>
+            <a:off x="2767497" y="5616312"/>
+            <a:ext cx="2239478" cy="60251"/>
+          </a:xfrm>
+          <a:prstGeom prst="straightConnector1">
+            <a:avLst/>
+          </a:prstGeom>
+          <a:ln>
+            <a:tailEnd type="triangle"/>
+          </a:ln>
+        </p:spPr>
+        <p:style>
+          <a:lnRef idx="1">
+            <a:schemeClr val="accent1"/>
+          </a:lnRef>
+          <a:fillRef idx="0">
+            <a:schemeClr val="accent1"/>
+          </a:fillRef>
+          <a:effectRef idx="0">
+            <a:schemeClr val="accent1"/>
+          </a:effectRef>
+          <a:fontRef idx="minor">
+            <a:schemeClr val="tx1"/>
+          </a:fontRef>
+        </p:style>
+      </p:cxnSp>
+      <p:sp>
+        <p:nvSpPr>
+          <p:cNvPr id="50" name="Rectángulo 49">
+            <a:extLst>
+              <a:ext uri="{FF2B5EF4-FFF2-40B4-BE49-F238E27FC236}">
+                <a16:creationId xmlns:a16="http://schemas.microsoft.com/office/drawing/2014/main" id="{6FD82BAC-8DAA-7B7E-01B3-A6305A2E888B}"/>
+              </a:ext>
+            </a:extLst>
+          </p:cNvPr>
+          <p:cNvSpPr/>
+          <p:nvPr/>
+        </p:nvSpPr>
+        <p:spPr>
+          <a:xfrm>
+            <a:off x="949874" y="7625852"/>
+            <a:ext cx="2151683" cy="1108142"/>
+          </a:xfrm>
+          <a:prstGeom prst="rect">
+            <a:avLst/>
+          </a:prstGeom>
+        </p:spPr>
+        <p:style>
+          <a:lnRef idx="1">
+            <a:schemeClr val="accent1"/>
+          </a:lnRef>
+          <a:fillRef idx="2">
+            <a:schemeClr val="accent1"/>
+          </a:fillRef>
+          <a:effectRef idx="1">
+            <a:schemeClr val="accent1"/>
+          </a:effectRef>
+          <a:fontRef idx="minor">
+            <a:schemeClr val="dk1"/>
+          </a:fontRef>
+        </p:style>
+        <p:txBody>
+          <a:bodyPr rtlCol="0" anchor="ctr"/>
+          <a:lstStyle/>
+          <a:p>
+            <a:pPr algn="ctr"/>
+            <a:endParaRPr lang="en-US" dirty="0">
+              <a:solidFill>
+                <a:schemeClr val="bg1"/>
+              </a:solidFill>
+            </a:endParaRPr>
+          </a:p>
+          <a:p>
+            <a:pPr algn="ctr"/>
+            <a:endParaRPr lang="en-US" dirty="0">
+              <a:solidFill>
+                <a:schemeClr val="bg1"/>
+              </a:solidFill>
+            </a:endParaRPr>
+          </a:p>
+          <a:p>
+            <a:pPr algn="ctr"/>
+            <a:r>
+              <a:rPr lang="en-US" dirty="0" err="1">
+                <a:solidFill>
+                  <a:schemeClr val="bg1"/>
+                </a:solidFill>
+              </a:rPr>
+              <a:t>Ancor</a:t>
+            </a:r>
+            <a:endParaRPr lang="en-US" dirty="0">
+              <a:solidFill>
+                <a:schemeClr val="bg1"/>
+              </a:solidFill>
+            </a:endParaRPr>
+          </a:p>
+          <a:p>
+            <a:pPr algn="ctr"/>
+            <a:r>
+              <a:rPr lang="en-US" sz="1000" i="1" dirty="0" err="1">
+                <a:solidFill>
+                  <a:schemeClr val="bg1"/>
+                </a:solidFill>
+              </a:rPr>
+              <a:t>Dirigen</a:t>
+            </a:r>
+            <a:r>
+              <a:rPr lang="en-US" sz="1000" i="1" dirty="0">
+                <a:solidFill>
+                  <a:schemeClr val="bg1"/>
+                </a:solidFill>
+              </a:rPr>
+              <a:t> al </a:t>
+            </a:r>
+            <a:r>
+              <a:rPr lang="en-US" sz="1000" i="1" dirty="0" err="1">
+                <a:solidFill>
+                  <a:schemeClr val="bg1"/>
+                </a:solidFill>
+              </a:rPr>
+              <a:t>usuario</a:t>
+            </a:r>
+            <a:r>
+              <a:rPr lang="en-US" sz="1000" i="1" dirty="0">
+                <a:solidFill>
+                  <a:schemeClr val="bg1"/>
+                </a:solidFill>
+              </a:rPr>
+              <a:t> </a:t>
+            </a:r>
+            <a:r>
+              <a:rPr lang="en-US" sz="1000" i="1" dirty="0" err="1">
+                <a:solidFill>
+                  <a:schemeClr val="bg1"/>
+                </a:solidFill>
+              </a:rPr>
+              <a:t>si</a:t>
+            </a:r>
+            <a:r>
+              <a:rPr lang="en-US" sz="1000" i="1" dirty="0">
+                <a:solidFill>
+                  <a:schemeClr val="bg1"/>
+                </a:solidFill>
+              </a:rPr>
+              <a:t> </a:t>
+            </a:r>
+            <a:r>
+              <a:rPr lang="en-US" sz="1000" i="1" dirty="0" err="1">
+                <a:solidFill>
+                  <a:schemeClr val="bg1"/>
+                </a:solidFill>
+              </a:rPr>
+              <a:t>quieren</a:t>
+            </a:r>
+            <a:r>
+              <a:rPr lang="en-US" sz="1000" i="1" dirty="0">
+                <a:solidFill>
+                  <a:schemeClr val="bg1"/>
+                </a:solidFill>
+              </a:rPr>
+              <a:t> registrar </a:t>
+            </a:r>
+            <a:r>
+              <a:rPr lang="en-US" sz="1000" i="1" dirty="0" err="1">
+                <a:solidFill>
+                  <a:schemeClr val="bg1"/>
+                </a:solidFill>
+              </a:rPr>
+              <a:t>una</a:t>
+            </a:r>
+            <a:r>
+              <a:rPr lang="en-US" sz="1000" i="1" dirty="0">
+                <a:solidFill>
+                  <a:schemeClr val="bg1"/>
+                </a:solidFill>
+              </a:rPr>
+              <a:t> </a:t>
+            </a:r>
+            <a:r>
+              <a:rPr lang="en-US" sz="1000" i="1" dirty="0" err="1">
+                <a:solidFill>
+                  <a:schemeClr val="bg1"/>
+                </a:solidFill>
+              </a:rPr>
+              <a:t>nueva</a:t>
+            </a:r>
+            <a:r>
+              <a:rPr lang="en-US" sz="1000" i="1" dirty="0">
+                <a:solidFill>
+                  <a:schemeClr val="bg1"/>
+                </a:solidFill>
+              </a:rPr>
+              <a:t> </a:t>
+            </a:r>
+            <a:r>
+              <a:rPr lang="en-US" sz="1000" i="1" dirty="0" err="1">
+                <a:solidFill>
+                  <a:schemeClr val="bg1"/>
+                </a:solidFill>
+              </a:rPr>
+              <a:t>cuenta</a:t>
+            </a:r>
+            <a:r>
+              <a:rPr lang="en-US" sz="1000" i="1" dirty="0">
+                <a:solidFill>
+                  <a:schemeClr val="bg1"/>
+                </a:solidFill>
+              </a:rPr>
+              <a:t> o </a:t>
+            </a:r>
+            <a:r>
+              <a:rPr lang="en-US" sz="1000" i="1" dirty="0" err="1">
+                <a:solidFill>
+                  <a:schemeClr val="bg1"/>
+                </a:solidFill>
+              </a:rPr>
+              <a:t>si</a:t>
+            </a:r>
+            <a:r>
+              <a:rPr lang="en-US" sz="1000" i="1" dirty="0">
+                <a:solidFill>
+                  <a:schemeClr val="bg1"/>
+                </a:solidFill>
+              </a:rPr>
+              <a:t> </a:t>
+            </a:r>
+            <a:r>
+              <a:rPr lang="en-US" sz="1000" i="1" dirty="0" err="1">
+                <a:solidFill>
+                  <a:schemeClr val="bg1"/>
+                </a:solidFill>
+              </a:rPr>
+              <a:t>quiere</a:t>
+            </a:r>
+            <a:r>
+              <a:rPr lang="en-US" sz="1000" i="1" dirty="0">
+                <a:solidFill>
+                  <a:schemeClr val="bg1"/>
+                </a:solidFill>
+              </a:rPr>
+              <a:t> </a:t>
+            </a:r>
+            <a:r>
+              <a:rPr lang="en-US" sz="1000" i="1" dirty="0" err="1">
+                <a:solidFill>
+                  <a:schemeClr val="bg1"/>
+                </a:solidFill>
+              </a:rPr>
+              <a:t>recuperar</a:t>
+            </a:r>
+            <a:r>
+              <a:rPr lang="en-US" sz="1000" i="1" dirty="0">
+                <a:solidFill>
+                  <a:schemeClr val="bg1"/>
+                </a:solidFill>
+              </a:rPr>
+              <a:t> </a:t>
+            </a:r>
+            <a:r>
+              <a:rPr lang="en-US" sz="1000" i="1" dirty="0" err="1">
+                <a:solidFill>
+                  <a:schemeClr val="bg1"/>
+                </a:solidFill>
+              </a:rPr>
+              <a:t>su</a:t>
+            </a:r>
+            <a:r>
+              <a:rPr lang="en-US" sz="1000" i="1" dirty="0">
+                <a:solidFill>
+                  <a:schemeClr val="bg1"/>
+                </a:solidFill>
+              </a:rPr>
+              <a:t> </a:t>
+            </a:r>
+            <a:r>
+              <a:rPr lang="en-US" sz="1000" i="1" dirty="0" err="1">
+                <a:solidFill>
+                  <a:schemeClr val="bg1"/>
+                </a:solidFill>
+              </a:rPr>
+              <a:t>contrasena</a:t>
+            </a:r>
+            <a:endParaRPr lang="en-US" sz="1000" i="1" dirty="0">
+              <a:solidFill>
+                <a:schemeClr val="bg1"/>
+              </a:solidFill>
+            </a:endParaRPr>
+          </a:p>
+          <a:p>
+            <a:pPr algn="ctr"/>
+            <a:endParaRPr lang="en-US" dirty="0">
+              <a:solidFill>
+                <a:schemeClr val="bg1"/>
+              </a:solidFill>
+            </a:endParaRPr>
+          </a:p>
+          <a:p>
+            <a:pPr algn="ctr"/>
+            <a:endParaRPr lang="es-MX" dirty="0">
+              <a:solidFill>
+                <a:schemeClr val="bg1"/>
+              </a:solidFill>
+            </a:endParaRPr>
+          </a:p>
+        </p:txBody>
+      </p:sp>
+      <p:cxnSp>
+        <p:nvCxnSpPr>
+          <p:cNvPr id="51" name="Conector recto de flecha 50">
+            <a:extLst>
+              <a:ext uri="{FF2B5EF4-FFF2-40B4-BE49-F238E27FC236}">
+                <a16:creationId xmlns:a16="http://schemas.microsoft.com/office/drawing/2014/main" id="{F26EB212-D4A2-D30A-9663-EE53A8D02D2A}"/>
+              </a:ext>
+            </a:extLst>
+          </p:cNvPr>
+          <p:cNvCxnSpPr>
+            <a:cxnSpLocks/>
+            <a:stCxn id="50" idx="3"/>
+            <a:endCxn id="12" idx="2"/>
+          </p:cNvCxnSpPr>
+          <p:nvPr/>
+        </p:nvCxnSpPr>
+        <p:spPr>
+          <a:xfrm flipV="1">
+            <a:off x="3101557" y="7335430"/>
+            <a:ext cx="1905418" cy="844493"/>
+          </a:xfrm>
+          <a:prstGeom prst="straightConnector1">
+            <a:avLst/>
+          </a:prstGeom>
+          <a:ln>
+            <a:tailEnd type="triangle"/>
+          </a:ln>
+        </p:spPr>
+        <p:style>
+          <a:lnRef idx="1">
+            <a:schemeClr val="accent1"/>
+          </a:lnRef>
+          <a:fillRef idx="0">
+            <a:schemeClr val="accent1"/>
+          </a:fillRef>
+          <a:effectRef idx="0">
+            <a:schemeClr val="accent1"/>
+          </a:effectRef>
+          <a:fontRef idx="minor">
+            <a:schemeClr val="tx1"/>
+          </a:fontRef>
+        </p:style>
+      </p:cxnSp>
+      <p:cxnSp>
+        <p:nvCxnSpPr>
+          <p:cNvPr id="54" name="Conector recto de flecha 53">
+            <a:extLst>
+              <a:ext uri="{FF2B5EF4-FFF2-40B4-BE49-F238E27FC236}">
+                <a16:creationId xmlns:a16="http://schemas.microsoft.com/office/drawing/2014/main" id="{66A85C28-9FEC-806A-BB3D-10453DD17E46}"/>
+              </a:ext>
+            </a:extLst>
+          </p:cNvPr>
+          <p:cNvCxnSpPr>
+            <a:cxnSpLocks/>
+            <a:endCxn id="13" idx="2"/>
+          </p:cNvCxnSpPr>
+          <p:nvPr/>
+        </p:nvCxnSpPr>
+        <p:spPr>
+          <a:xfrm flipV="1">
+            <a:off x="3101557" y="7612429"/>
+            <a:ext cx="4381918" cy="558644"/>
+          </a:xfrm>
+          <a:prstGeom prst="straightConnector1">
+            <a:avLst/>
+          </a:prstGeom>
+          <a:ln>
+            <a:tailEnd type="triangle"/>
+          </a:ln>
+        </p:spPr>
+        <p:style>
+          <a:lnRef idx="1">
+            <a:schemeClr val="accent1"/>
+          </a:lnRef>
+          <a:fillRef idx="0">
+            <a:schemeClr val="accent1"/>
+          </a:fillRef>
+          <a:effectRef idx="0">
+            <a:schemeClr val="accent1"/>
+          </a:effectRef>
+          <a:fontRef idx="minor">
+            <a:schemeClr val="tx1"/>
+          </a:fontRef>
+        </p:style>
+      </p:cxnSp>
     </p:spTree>
     <p:extLst>
       <p:ext uri="{BB962C8B-B14F-4D97-AF65-F5344CB8AC3E}">

</xml_diff>